<commit_message>
Added support foer TinyMCE WYSIWIG
</commit_message>
<xml_diff>
--- a/ghostwriter/reporting/templates/reports/template.pptx
+++ b/ghostwriter/reporting/templates/reports/template.pptx
@@ -213,7 +213,7 @@
           <a:p>
             <a:fld id="{F655BFE0-ECC4-8C48-AAA2-E89F961E7295}" type="datetimeFigureOut">
               <a:rPr lang="en-US" smtClean="0"/>
-              <a:t>7/26/19</a:t>
+              <a:t>12/17/19</a:t>
             </a:fld>
             <a:endParaRPr lang="en-US"/>
           </a:p>
@@ -390,7 +390,7 @@
           <a:p>
             <a:fld id="{238C35A0-2413-3B4F-BA04-92FA81CCB656}" type="datetimeFigureOut">
               <a:rPr lang="en-US" smtClean="0"/>
-              <a:t>7/26/19</a:t>
+              <a:t>12/17/19</a:t>
             </a:fld>
             <a:endParaRPr lang="en-US"/>
           </a:p>
@@ -682,8 +682,8 @@
         </p:nvSpPr>
         <p:spPr>
           <a:xfrm>
-            <a:off x="0" y="0"/>
-            <a:ext cx="12192000" cy="6858000"/>
+            <a:off x="-10160" y="-10160"/>
+            <a:ext cx="12202160" cy="6868160"/>
           </a:xfrm>
           <a:prstGeom prst="rect">
             <a:avLst/>
@@ -940,8 +940,8 @@
         </p:blipFill>
         <p:spPr>
           <a:xfrm>
-            <a:off x="4658095" y="415486"/>
-            <a:ext cx="2514600" cy="2806700"/>
+            <a:off x="4968342" y="583800"/>
+            <a:ext cx="2048089" cy="2286000"/>
           </a:xfrm>
           <a:prstGeom prst="rect">
             <a:avLst/>
@@ -1172,13 +1172,22 @@
         </p:spPr>
         <p:txBody>
           <a:bodyPr/>
-          <a:lstStyle/>
+          <a:lstStyle>
+            <a:lvl1pPr>
+              <a:defRPr>
+                <a:solidFill>
+                  <a:schemeClr val="bg1"/>
+                </a:solidFill>
+              </a:defRPr>
+            </a:lvl1pPr>
+          </a:lstStyle>
           <a:p>
             <a:fld id="{B19BF9E0-23D0-AA4D-9EB9-DD4CE800D881}" type="datetime1">
               <a:rPr lang="en-US" smtClean="0"/>
-              <a:t>7/26/19</a:t>
+              <a:pPr/>
+              <a:t>12/17/19</a:t>
             </a:fld>
-            <a:endParaRPr lang="en-US"/>
+            <a:endParaRPr lang="en-US" dirty="0"/>
           </a:p>
         </p:txBody>
       </p:sp>
@@ -1226,13 +1235,22 @@
         </p:spPr>
         <p:txBody>
           <a:bodyPr/>
-          <a:lstStyle/>
+          <a:lstStyle>
+            <a:lvl1pPr algn="r">
+              <a:defRPr>
+                <a:solidFill>
+                  <a:schemeClr val="bg1"/>
+                </a:solidFill>
+              </a:defRPr>
+            </a:lvl1pPr>
+          </a:lstStyle>
           <a:p>
             <a:fld id="{850B62A3-F34D-7F44-AFE9-F6B5F5D3FEA3}" type="slidenum">
               <a:rPr lang="en-US" smtClean="0"/>
+              <a:pPr/>
               <a:t>‹#›</a:t>
             </a:fld>
-            <a:endParaRPr lang="en-US"/>
+            <a:endParaRPr lang="en-US" dirty="0"/>
           </a:p>
         </p:txBody>
       </p:sp>
@@ -1360,13 +1378,22 @@
         </p:spPr>
         <p:txBody>
           <a:bodyPr/>
-          <a:lstStyle/>
+          <a:lstStyle>
+            <a:lvl1pPr>
+              <a:defRPr>
+                <a:solidFill>
+                  <a:schemeClr val="bg1"/>
+                </a:solidFill>
+              </a:defRPr>
+            </a:lvl1pPr>
+          </a:lstStyle>
           <a:p>
             <a:fld id="{5E61854F-676F-4C40-8515-1AF6D823C89B}" type="datetime1">
               <a:rPr lang="en-US" smtClean="0"/>
-              <a:t>7/26/19</a:t>
+              <a:pPr/>
+              <a:t>12/17/19</a:t>
             </a:fld>
-            <a:endParaRPr lang="en-US"/>
+            <a:endParaRPr lang="en-US" dirty="0"/>
           </a:p>
         </p:txBody>
       </p:sp>
@@ -1414,13 +1441,22 @@
         </p:spPr>
         <p:txBody>
           <a:bodyPr/>
-          <a:lstStyle/>
+          <a:lstStyle>
+            <a:lvl1pPr algn="r">
+              <a:defRPr>
+                <a:solidFill>
+                  <a:schemeClr val="bg1"/>
+                </a:solidFill>
+              </a:defRPr>
+            </a:lvl1pPr>
+          </a:lstStyle>
           <a:p>
             <a:fld id="{850B62A3-F34D-7F44-AFE9-F6B5F5D3FEA3}" type="slidenum">
               <a:rPr lang="en-US" smtClean="0"/>
+              <a:pPr/>
               <a:t>‹#›</a:t>
             </a:fld>
-            <a:endParaRPr lang="en-US"/>
+            <a:endParaRPr lang="en-US" dirty="0"/>
           </a:p>
         </p:txBody>
       </p:sp>
@@ -1558,13 +1594,22 @@
         </p:spPr>
         <p:txBody>
           <a:bodyPr/>
-          <a:lstStyle/>
+          <a:lstStyle>
+            <a:lvl1pPr>
+              <a:defRPr>
+                <a:solidFill>
+                  <a:schemeClr val="bg1"/>
+                </a:solidFill>
+              </a:defRPr>
+            </a:lvl1pPr>
+          </a:lstStyle>
           <a:p>
             <a:fld id="{F13DCD3E-A640-024C-94F5-F73CCF6B7E94}" type="datetime1">
               <a:rPr lang="en-US" smtClean="0"/>
-              <a:t>7/26/19</a:t>
+              <a:pPr/>
+              <a:t>12/17/19</a:t>
             </a:fld>
-            <a:endParaRPr lang="en-US"/>
+            <a:endParaRPr lang="en-US" dirty="0"/>
           </a:p>
         </p:txBody>
       </p:sp>
@@ -1612,13 +1657,22 @@
         </p:spPr>
         <p:txBody>
           <a:bodyPr/>
-          <a:lstStyle/>
+          <a:lstStyle>
+            <a:lvl1pPr algn="r">
+              <a:defRPr>
+                <a:solidFill>
+                  <a:schemeClr val="bg1"/>
+                </a:solidFill>
+              </a:defRPr>
+            </a:lvl1pPr>
+          </a:lstStyle>
           <a:p>
             <a:fld id="{850B62A3-F34D-7F44-AFE9-F6B5F5D3FEA3}" type="slidenum">
               <a:rPr lang="en-US" smtClean="0"/>
+              <a:pPr/>
               <a:t>‹#›</a:t>
             </a:fld>
-            <a:endParaRPr lang="en-US"/>
+            <a:endParaRPr lang="en-US" dirty="0"/>
           </a:p>
         </p:txBody>
       </p:sp>
@@ -1759,8 +1813,8 @@
         </p:nvSpPr>
         <p:spPr>
           <a:xfrm>
-            <a:off x="0" y="-41564"/>
-            <a:ext cx="12192000" cy="6941127"/>
+            <a:off x="-10160" y="-51723"/>
+            <a:ext cx="12202160" cy="6909724"/>
           </a:xfrm>
           <a:prstGeom prst="rect">
             <a:avLst/>
@@ -2527,7 +2581,7 @@
           <a:p>
             <a:fld id="{126FEC1E-BA93-A742-8719-C773E6DC92F4}" type="datetime1">
               <a:rPr lang="en-US" smtClean="0"/>
-              <a:t>7/26/19</a:t>
+              <a:t>12/17/19</a:t>
             </a:fld>
             <a:endParaRPr lang="en-US"/>
           </a:p>
@@ -3092,7 +3146,7 @@
           <a:p>
             <a:fld id="{CCA7A0DF-C3D8-9D43-8DE8-66E91FB1F5C2}" type="datetime1">
               <a:rPr lang="en-US" smtClean="0"/>
-              <a:t>7/26/19</a:t>
+              <a:t>12/17/19</a:t>
             </a:fld>
             <a:endParaRPr lang="en-US"/>
           </a:p>
@@ -3471,7 +3525,7 @@
           <a:p>
             <a:fld id="{0D2D8EBF-F4C0-1644-A9CB-2C5389C8DE34}" type="datetime1">
               <a:rPr lang="en-US" smtClean="0"/>
-              <a:t>7/26/19</a:t>
+              <a:t>12/17/19</a:t>
             </a:fld>
             <a:endParaRPr lang="en-US"/>
           </a:p>
@@ -3603,7 +3657,7 @@
           <a:p>
             <a:fld id="{CB7EC9CC-2D35-B642-955D-8E6C15C97055}" type="datetime1">
               <a:rPr lang="en-US" smtClean="0"/>
-              <a:t>7/26/19</a:t>
+              <a:t>12/17/19</a:t>
             </a:fld>
             <a:endParaRPr lang="en-US"/>
           </a:p>
@@ -3823,13 +3877,22 @@
         </p:spPr>
         <p:txBody>
           <a:bodyPr/>
-          <a:lstStyle/>
+          <a:lstStyle>
+            <a:lvl1pPr>
+              <a:defRPr>
+                <a:solidFill>
+                  <a:schemeClr val="bg1"/>
+                </a:solidFill>
+              </a:defRPr>
+            </a:lvl1pPr>
+          </a:lstStyle>
           <a:p>
             <a:fld id="{01A07ABA-737E-B940-885E-88FDAFE88ADA}" type="datetime1">
               <a:rPr lang="en-US" smtClean="0"/>
-              <a:t>7/26/19</a:t>
+              <a:pPr/>
+              <a:t>12/17/19</a:t>
             </a:fld>
-            <a:endParaRPr lang="en-US"/>
+            <a:endParaRPr lang="en-US" dirty="0"/>
           </a:p>
         </p:txBody>
       </p:sp>
@@ -3885,13 +3948,22 @@
         </p:spPr>
         <p:txBody>
           <a:bodyPr/>
-          <a:lstStyle/>
+          <a:lstStyle>
+            <a:lvl1pPr algn="r">
+              <a:defRPr>
+                <a:solidFill>
+                  <a:schemeClr val="bg1"/>
+                </a:solidFill>
+              </a:defRPr>
+            </a:lvl1pPr>
+          </a:lstStyle>
           <a:p>
             <a:fld id="{850B62A3-F34D-7F44-AFE9-F6B5F5D3FEA3}" type="slidenum">
               <a:rPr lang="en-US" smtClean="0"/>
+              <a:pPr/>
               <a:t>‹#›</a:t>
             </a:fld>
-            <a:endParaRPr lang="en-US"/>
+            <a:endParaRPr lang="en-US" dirty="0"/>
           </a:p>
         </p:txBody>
       </p:sp>
@@ -3950,7 +4022,7 @@
           <a:p>
             <a:fld id="{74FB62FF-5583-3F43-A7D3-AC0749E37AB1}" type="datetime1">
               <a:rPr lang="en-US" smtClean="0"/>
-              <a:t>7/26/19</a:t>
+              <a:t>12/17/19</a:t>
             </a:fld>
             <a:endParaRPr lang="en-US"/>
           </a:p>
@@ -4240,7 +4312,7 @@
           <a:p>
             <a:fld id="{D5183357-46CF-434B-963D-8CD4C09E68A1}" type="datetime1">
               <a:rPr lang="en-US" smtClean="0"/>
-              <a:t>7/26/19</a:t>
+              <a:t>12/17/19</a:t>
             </a:fld>
             <a:endParaRPr lang="en-US"/>
           </a:p>
@@ -4507,7 +4579,7 @@
           <a:p>
             <a:fld id="{9188BA0B-BA2B-0E48-B1DF-9B2BAE1B07ED}" type="datetime1">
               <a:rPr lang="en-US" smtClean="0"/>
-              <a:t>7/26/19</a:t>
+              <a:t>12/17/19</a:t>
             </a:fld>
             <a:endParaRPr lang="en-US"/>
           </a:p>
@@ -4690,7 +4762,7 @@
           <a:p>
             <a:fld id="{DA6FFF67-2BB1-C047-B412-FDE39B8420A2}" type="datetime1">
               <a:rPr lang="en-US" smtClean="0"/>
-              <a:t>7/26/19</a:t>
+              <a:t>12/17/19</a:t>
             </a:fld>
             <a:endParaRPr lang="en-US"/>
           </a:p>
@@ -4883,7 +4955,7 @@
           <a:p>
             <a:fld id="{4FC56D0A-879B-9843-8782-B2B9B81BEF64}" type="datetime1">
               <a:rPr lang="en-US" smtClean="0"/>
-              <a:t>7/26/19</a:t>
+              <a:t>12/17/19</a:t>
             </a:fld>
             <a:endParaRPr lang="en-US"/>
           </a:p>
@@ -5139,13 +5211,22 @@
         </p:spPr>
         <p:txBody>
           <a:bodyPr/>
-          <a:lstStyle/>
+          <a:lstStyle>
+            <a:lvl1pPr>
+              <a:defRPr>
+                <a:solidFill>
+                  <a:schemeClr val="bg1"/>
+                </a:solidFill>
+              </a:defRPr>
+            </a:lvl1pPr>
+          </a:lstStyle>
           <a:p>
             <a:fld id="{8AD19A97-9375-5242-A8F8-EF9FB329B087}" type="datetime1">
               <a:rPr lang="en-US" smtClean="0"/>
-              <a:t>7/26/19</a:t>
+              <a:pPr/>
+              <a:t>12/17/19</a:t>
             </a:fld>
-            <a:endParaRPr lang="en-US"/>
+            <a:endParaRPr lang="en-US" dirty="0"/>
           </a:p>
         </p:txBody>
       </p:sp>
@@ -5193,13 +5274,22 @@
         </p:spPr>
         <p:txBody>
           <a:bodyPr/>
-          <a:lstStyle/>
+          <a:lstStyle>
+            <a:lvl1pPr algn="r">
+              <a:defRPr>
+                <a:solidFill>
+                  <a:schemeClr val="bg1"/>
+                </a:solidFill>
+              </a:defRPr>
+            </a:lvl1pPr>
+          </a:lstStyle>
           <a:p>
             <a:fld id="{850B62A3-F34D-7F44-AFE9-F6B5F5D3FEA3}" type="slidenum">
               <a:rPr lang="en-US" smtClean="0"/>
+              <a:pPr/>
               <a:t>‹#›</a:t>
             </a:fld>
-            <a:endParaRPr lang="en-US"/>
+            <a:endParaRPr lang="en-US" dirty="0"/>
           </a:p>
         </p:txBody>
       </p:sp>
@@ -5241,8 +5331,8 @@
         </p:nvSpPr>
         <p:spPr>
           <a:xfrm>
-            <a:off x="0" y="0"/>
-            <a:ext cx="12192000" cy="6858000"/>
+            <a:off x="-10160" y="-10160"/>
+            <a:ext cx="12202160" cy="6868160"/>
           </a:xfrm>
           <a:prstGeom prst="rect">
             <a:avLst/>
@@ -5480,10 +5570,10 @@
       </p:cxnSp>
       <p:pic>
         <p:nvPicPr>
-          <p:cNvPr id="10" name="Picture 9">
+          <p:cNvPr id="9" name="Picture 8">
             <a:extLst>
               <a:ext uri="{FF2B5EF4-FFF2-40B4-BE49-F238E27FC236}">
-                <a16:creationId xmlns:a16="http://schemas.microsoft.com/office/drawing/2014/main" id="{CEE578A6-20DE-264C-BFF8-FA5C16341A3D}"/>
+                <a16:creationId xmlns:a16="http://schemas.microsoft.com/office/drawing/2014/main" id="{4209F8D6-B62F-1144-B9F7-5D3C9E67D373}"/>
               </a:ext>
             </a:extLst>
           </p:cNvPr>
@@ -5500,8 +5590,8 @@
         </p:blipFill>
         <p:spPr>
           <a:xfrm>
-            <a:off x="4838700" y="275851"/>
-            <a:ext cx="2514600" cy="2806700"/>
+            <a:off x="4968342" y="583800"/>
+            <a:ext cx="2048089" cy="2286000"/>
           </a:xfrm>
           <a:prstGeom prst="rect">
             <a:avLst/>
@@ -5688,13 +5778,22 @@
         </p:spPr>
         <p:txBody>
           <a:bodyPr/>
-          <a:lstStyle/>
+          <a:lstStyle>
+            <a:lvl1pPr>
+              <a:defRPr>
+                <a:solidFill>
+                  <a:schemeClr val="bg1"/>
+                </a:solidFill>
+              </a:defRPr>
+            </a:lvl1pPr>
+          </a:lstStyle>
           <a:p>
             <a:fld id="{70CCD242-71D9-0B41-89CE-88A9D4CFE536}" type="datetime1">
               <a:rPr lang="en-US" smtClean="0"/>
-              <a:t>7/26/19</a:t>
+              <a:pPr/>
+              <a:t>12/17/19</a:t>
             </a:fld>
-            <a:endParaRPr lang="en-US"/>
+            <a:endParaRPr lang="en-US" dirty="0"/>
           </a:p>
         </p:txBody>
       </p:sp>
@@ -5742,13 +5841,22 @@
         </p:spPr>
         <p:txBody>
           <a:bodyPr/>
-          <a:lstStyle/>
+          <a:lstStyle>
+            <a:lvl1pPr algn="r">
+              <a:defRPr>
+                <a:solidFill>
+                  <a:schemeClr val="bg1"/>
+                </a:solidFill>
+              </a:defRPr>
+            </a:lvl1pPr>
+          </a:lstStyle>
           <a:p>
             <a:fld id="{850B62A3-F34D-7F44-AFE9-F6B5F5D3FEA3}" type="slidenum">
               <a:rPr lang="en-US" smtClean="0"/>
+              <a:pPr/>
               <a:t>‹#›</a:t>
             </a:fld>
-            <a:endParaRPr lang="en-US"/>
+            <a:endParaRPr lang="en-US" dirty="0"/>
           </a:p>
         </p:txBody>
       </p:sp>
@@ -6072,13 +6180,22 @@
         </p:spPr>
         <p:txBody>
           <a:bodyPr/>
-          <a:lstStyle/>
+          <a:lstStyle>
+            <a:lvl1pPr>
+              <a:defRPr>
+                <a:solidFill>
+                  <a:schemeClr val="bg1"/>
+                </a:solidFill>
+              </a:defRPr>
+            </a:lvl1pPr>
+          </a:lstStyle>
           <a:p>
             <a:fld id="{0238D314-2C76-E844-98B1-DB8FFB9F51BE}" type="datetime1">
               <a:rPr lang="en-US" smtClean="0"/>
-              <a:t>7/26/19</a:t>
+              <a:pPr/>
+              <a:t>12/17/19</a:t>
             </a:fld>
-            <a:endParaRPr lang="en-US"/>
+            <a:endParaRPr lang="en-US" dirty="0"/>
           </a:p>
         </p:txBody>
       </p:sp>
@@ -6126,13 +6243,22 @@
         </p:spPr>
         <p:txBody>
           <a:bodyPr/>
-          <a:lstStyle/>
+          <a:lstStyle>
+            <a:lvl1pPr algn="r">
+              <a:defRPr>
+                <a:solidFill>
+                  <a:schemeClr val="bg1"/>
+                </a:solidFill>
+              </a:defRPr>
+            </a:lvl1pPr>
+          </a:lstStyle>
           <a:p>
             <a:fld id="{850B62A3-F34D-7F44-AFE9-F6B5F5D3FEA3}" type="slidenum">
               <a:rPr lang="en-US" smtClean="0"/>
+              <a:pPr/>
               <a:t>‹#›</a:t>
             </a:fld>
-            <a:endParaRPr lang="en-US"/>
+            <a:endParaRPr lang="en-US" dirty="0"/>
           </a:p>
         </p:txBody>
       </p:sp>
@@ -6209,13 +6335,22 @@
         </p:spPr>
         <p:txBody>
           <a:bodyPr/>
-          <a:lstStyle/>
+          <a:lstStyle>
+            <a:lvl1pPr>
+              <a:defRPr>
+                <a:solidFill>
+                  <a:schemeClr val="bg1"/>
+                </a:solidFill>
+              </a:defRPr>
+            </a:lvl1pPr>
+          </a:lstStyle>
           <a:p>
             <a:fld id="{0301FEA2-222B-174C-99C9-5F99D67544F0}" type="datetime1">
               <a:rPr lang="en-US" smtClean="0"/>
-              <a:t>7/26/19</a:t>
+              <a:pPr/>
+              <a:t>12/17/19</a:t>
             </a:fld>
-            <a:endParaRPr lang="en-US"/>
+            <a:endParaRPr lang="en-US" dirty="0"/>
           </a:p>
         </p:txBody>
       </p:sp>
@@ -6263,13 +6398,22 @@
         </p:spPr>
         <p:txBody>
           <a:bodyPr/>
-          <a:lstStyle/>
+          <a:lstStyle>
+            <a:lvl1pPr algn="r">
+              <a:defRPr>
+                <a:solidFill>
+                  <a:schemeClr val="bg1"/>
+                </a:solidFill>
+              </a:defRPr>
+            </a:lvl1pPr>
+          </a:lstStyle>
           <a:p>
             <a:fld id="{850B62A3-F34D-7F44-AFE9-F6B5F5D3FEA3}" type="slidenum">
               <a:rPr lang="en-US" smtClean="0"/>
+              <a:pPr/>
               <a:t>‹#›</a:t>
             </a:fld>
-            <a:endParaRPr lang="en-US"/>
+            <a:endParaRPr lang="en-US" dirty="0"/>
           </a:p>
         </p:txBody>
       </p:sp>
@@ -6324,13 +6468,22 @@
         </p:spPr>
         <p:txBody>
           <a:bodyPr/>
-          <a:lstStyle/>
+          <a:lstStyle>
+            <a:lvl1pPr>
+              <a:defRPr>
+                <a:solidFill>
+                  <a:schemeClr val="bg1"/>
+                </a:solidFill>
+              </a:defRPr>
+            </a:lvl1pPr>
+          </a:lstStyle>
           <a:p>
             <a:fld id="{2539763C-9DA3-3A45-83CD-E398A8334719}" type="datetime1">
               <a:rPr lang="en-US" smtClean="0"/>
-              <a:t>7/26/19</a:t>
+              <a:pPr/>
+              <a:t>12/17/19</a:t>
             </a:fld>
-            <a:endParaRPr lang="en-US"/>
+            <a:endParaRPr lang="en-US" dirty="0"/>
           </a:p>
         </p:txBody>
       </p:sp>
@@ -6378,13 +6531,22 @@
         </p:spPr>
         <p:txBody>
           <a:bodyPr/>
-          <a:lstStyle/>
+          <a:lstStyle>
+            <a:lvl1pPr algn="r">
+              <a:defRPr>
+                <a:solidFill>
+                  <a:schemeClr val="bg1"/>
+                </a:solidFill>
+              </a:defRPr>
+            </a:lvl1pPr>
+          </a:lstStyle>
           <a:p>
             <a:fld id="{850B62A3-F34D-7F44-AFE9-F6B5F5D3FEA3}" type="slidenum">
               <a:rPr lang="en-US" smtClean="0"/>
+              <a:pPr/>
               <a:t>‹#›</a:t>
             </a:fld>
-            <a:endParaRPr lang="en-US"/>
+            <a:endParaRPr lang="en-US" dirty="0"/>
           </a:p>
         </p:txBody>
       </p:sp>
@@ -6619,11 +6781,20 @@
         </p:spPr>
         <p:txBody>
           <a:bodyPr/>
-          <a:lstStyle/>
+          <a:lstStyle>
+            <a:lvl1pPr>
+              <a:defRPr>
+                <a:solidFill>
+                  <a:schemeClr val="bg1"/>
+                </a:solidFill>
+              </a:defRPr>
+            </a:lvl1pPr>
+          </a:lstStyle>
           <a:p>
             <a:fld id="{343D8E90-9D5D-BC44-A133-7984A60C94F9}" type="datetime1">
               <a:rPr lang="en-US" smtClean="0"/>
-              <a:t>7/26/19</a:t>
+              <a:pPr/>
+              <a:t>12/17/19</a:t>
             </a:fld>
             <a:endParaRPr lang="en-US" dirty="0"/>
           </a:p>
@@ -6673,13 +6844,18 @@
         </p:spPr>
         <p:txBody>
           <a:bodyPr/>
-          <a:lstStyle/>
+          <a:lstStyle>
+            <a:lvl1pPr algn="r">
+              <a:defRPr/>
+            </a:lvl1pPr>
+          </a:lstStyle>
           <a:p>
             <a:fld id="{850B62A3-F34D-7F44-AFE9-F6B5F5D3FEA3}" type="slidenum">
               <a:rPr lang="en-US" smtClean="0"/>
+              <a:pPr/>
               <a:t>‹#›</a:t>
             </a:fld>
-            <a:endParaRPr lang="en-US"/>
+            <a:endParaRPr lang="en-US" dirty="0"/>
           </a:p>
         </p:txBody>
       </p:sp>

</xml_diff>